<commit_message>
runtime error, syntax error, complier error
</commit_message>
<xml_diff>
--- a/homeworks_musab_sakar.pptx
+++ b/homeworks_musab_sakar.pptx
@@ -20,6 +20,7 @@
     <p:sldId id="268" r:id="rId14"/>
     <p:sldId id="269" r:id="rId15"/>
     <p:sldId id="270" r:id="rId16"/>
+    <p:sldId id="271" r:id="rId17"/>
   </p:sldIdLst>
   <p:sldSz cx="9144000" cy="6858000" type="screen4x3"/>
   <p:notesSz cx="6858000" cy="9144000"/>
@@ -303,7 +304,7 @@
             <a:fld id="{194CBBFF-B9F9-477E-9B1F-DD9A3FC6F727}" type="datetimeFigureOut">
               <a:rPr lang="tr-TR" smtClean="0"/>
               <a:pPr/>
-              <a:t>31.5.2022</a:t>
+              <a:t>4.6.2022</a:t>
             </a:fld>
             <a:endParaRPr lang="tr-TR"/>
           </a:p>
@@ -470,7 +471,7 @@
             <a:fld id="{194CBBFF-B9F9-477E-9B1F-DD9A3FC6F727}" type="datetimeFigureOut">
               <a:rPr lang="tr-TR" smtClean="0"/>
               <a:pPr/>
-              <a:t>31.5.2022</a:t>
+              <a:t>4.6.2022</a:t>
             </a:fld>
             <a:endParaRPr lang="tr-TR"/>
           </a:p>
@@ -647,7 +648,7 @@
             <a:fld id="{194CBBFF-B9F9-477E-9B1F-DD9A3FC6F727}" type="datetimeFigureOut">
               <a:rPr lang="tr-TR" smtClean="0"/>
               <a:pPr/>
-              <a:t>31.5.2022</a:t>
+              <a:t>4.6.2022</a:t>
             </a:fld>
             <a:endParaRPr lang="tr-TR"/>
           </a:p>
@@ -814,7 +815,7 @@
             <a:fld id="{194CBBFF-B9F9-477E-9B1F-DD9A3FC6F727}" type="datetimeFigureOut">
               <a:rPr lang="tr-TR" smtClean="0"/>
               <a:pPr/>
-              <a:t>31.5.2022</a:t>
+              <a:t>4.6.2022</a:t>
             </a:fld>
             <a:endParaRPr lang="tr-TR"/>
           </a:p>
@@ -1057,7 +1058,7 @@
             <a:fld id="{194CBBFF-B9F9-477E-9B1F-DD9A3FC6F727}" type="datetimeFigureOut">
               <a:rPr lang="tr-TR" smtClean="0"/>
               <a:pPr/>
-              <a:t>31.5.2022</a:t>
+              <a:t>4.6.2022</a:t>
             </a:fld>
             <a:endParaRPr lang="tr-TR"/>
           </a:p>
@@ -1342,7 +1343,7 @@
             <a:fld id="{194CBBFF-B9F9-477E-9B1F-DD9A3FC6F727}" type="datetimeFigureOut">
               <a:rPr lang="tr-TR" smtClean="0"/>
               <a:pPr/>
-              <a:t>31.5.2022</a:t>
+              <a:t>4.6.2022</a:t>
             </a:fld>
             <a:endParaRPr lang="tr-TR"/>
           </a:p>
@@ -1761,7 +1762,7 @@
             <a:fld id="{194CBBFF-B9F9-477E-9B1F-DD9A3FC6F727}" type="datetimeFigureOut">
               <a:rPr lang="tr-TR" smtClean="0"/>
               <a:pPr/>
-              <a:t>31.5.2022</a:t>
+              <a:t>4.6.2022</a:t>
             </a:fld>
             <a:endParaRPr lang="tr-TR"/>
           </a:p>
@@ -1876,7 +1877,7 @@
             <a:fld id="{194CBBFF-B9F9-477E-9B1F-DD9A3FC6F727}" type="datetimeFigureOut">
               <a:rPr lang="tr-TR" smtClean="0"/>
               <a:pPr/>
-              <a:t>31.5.2022</a:t>
+              <a:t>4.6.2022</a:t>
             </a:fld>
             <a:endParaRPr lang="tr-TR"/>
           </a:p>
@@ -1968,7 +1969,7 @@
             <a:fld id="{194CBBFF-B9F9-477E-9B1F-DD9A3FC6F727}" type="datetimeFigureOut">
               <a:rPr lang="tr-TR" smtClean="0"/>
               <a:pPr/>
-              <a:t>31.5.2022</a:t>
+              <a:t>4.6.2022</a:t>
             </a:fld>
             <a:endParaRPr lang="tr-TR"/>
           </a:p>
@@ -2242,7 +2243,7 @@
             <a:fld id="{194CBBFF-B9F9-477E-9B1F-DD9A3FC6F727}" type="datetimeFigureOut">
               <a:rPr lang="tr-TR" smtClean="0"/>
               <a:pPr/>
-              <a:t>31.5.2022</a:t>
+              <a:t>4.6.2022</a:t>
             </a:fld>
             <a:endParaRPr lang="tr-TR"/>
           </a:p>
@@ -2492,7 +2493,7 @@
             <a:fld id="{194CBBFF-B9F9-477E-9B1F-DD9A3FC6F727}" type="datetimeFigureOut">
               <a:rPr lang="tr-TR" smtClean="0"/>
               <a:pPr/>
-              <a:t>31.5.2022</a:t>
+              <a:t>4.6.2022</a:t>
             </a:fld>
             <a:endParaRPr lang="tr-TR"/>
           </a:p>
@@ -2702,7 +2703,7 @@
             <a:fld id="{194CBBFF-B9F9-477E-9B1F-DD9A3FC6F727}" type="datetimeFigureOut">
               <a:rPr lang="tr-TR" smtClean="0"/>
               <a:pPr/>
-              <a:t>31.5.2022</a:t>
+              <a:t>4.6.2022</a:t>
             </a:fld>
             <a:endParaRPr lang="tr-TR"/>
           </a:p>
@@ -4363,71 +4364,59 @@
             </a:r>
             <a:r>
               <a:rPr lang="en-US" dirty="0" smtClean="0"/>
-              <a:t>integrate changes from one branch into another branch but in different ways</a:t>
+              <a:t>integrate changes from one branch into another branch but in different ways.</a:t>
+            </a:r>
+            <a:endParaRPr lang="tr-TR" dirty="0" smtClean="0"/>
+          </a:p>
+          <a:p>
+            <a:r>
+              <a:rPr lang="tr-TR" dirty="0" err="1" smtClean="0"/>
+              <a:t>Merging</a:t>
+            </a:r>
+            <a:r>
+              <a:rPr lang="tr-TR" dirty="0" smtClean="0"/>
+              <a:t> </a:t>
             </a:r>
             <a:r>
               <a:rPr lang="en-US" dirty="0" smtClean="0"/>
+              <a:t>takes the contents of the feature branch and integrates it with the master branch.</a:t>
+            </a:r>
+            <a:r>
+              <a:rPr lang="tr-TR" dirty="0" smtClean="0"/>
+              <a:t> As a </a:t>
+            </a:r>
+            <a:r>
+              <a:rPr lang="tr-TR" dirty="0" err="1" smtClean="0"/>
+              <a:t>result</a:t>
+            </a:r>
+            <a:r>
+              <a:rPr lang="tr-TR" dirty="0" smtClean="0"/>
+              <a:t>, </a:t>
+            </a:r>
+            <a:r>
+              <a:rPr lang="tr-TR" dirty="0" err="1" smtClean="0"/>
+              <a:t>commit</a:t>
+            </a:r>
+            <a:r>
+              <a:rPr lang="tr-TR" dirty="0" smtClean="0"/>
+              <a:t> </a:t>
+            </a:r>
+            <a:r>
+              <a:rPr lang="tr-TR" dirty="0" err="1" smtClean="0"/>
+              <a:t>history</a:t>
+            </a:r>
+            <a:r>
+              <a:rPr lang="tr-TR" dirty="0" smtClean="0"/>
+              <a:t> is </a:t>
+            </a:r>
+            <a:r>
+              <a:rPr lang="tr-TR" dirty="0" err="1" smtClean="0"/>
+              <a:t>preserved</a:t>
+            </a:r>
+            <a:r>
+              <a:rPr lang="tr-TR" dirty="0" smtClean="0"/>
               <a:t>.</a:t>
             </a:r>
-            <a:endParaRPr lang="tr-TR" dirty="0" smtClean="0"/>
-          </a:p>
-          <a:p>
-            <a:r>
-              <a:rPr lang="tr-TR" dirty="0" err="1" smtClean="0"/>
-              <a:t>Merging</a:t>
-            </a:r>
-            <a:r>
-              <a:rPr lang="tr-TR" dirty="0" smtClean="0"/>
-              <a:t> </a:t>
-            </a:r>
-            <a:r>
-              <a:rPr lang="en-US" dirty="0" smtClean="0"/>
-              <a:t>takes </a:t>
-            </a:r>
-            <a:r>
-              <a:rPr lang="en-US" dirty="0" smtClean="0"/>
-              <a:t>the contents of the feature branch and integrates it with the master branch</a:t>
-            </a:r>
-            <a:r>
-              <a:rPr lang="en-US" dirty="0" smtClean="0"/>
-              <a:t>.</a:t>
-            </a:r>
-            <a:r>
-              <a:rPr lang="tr-TR" dirty="0" smtClean="0"/>
-              <a:t> As a </a:t>
-            </a:r>
-            <a:r>
-              <a:rPr lang="tr-TR" dirty="0" err="1" smtClean="0"/>
-              <a:t>result</a:t>
-            </a:r>
-            <a:r>
-              <a:rPr lang="tr-TR" dirty="0" smtClean="0"/>
-              <a:t>, </a:t>
-            </a:r>
-            <a:r>
-              <a:rPr lang="tr-TR" dirty="0" err="1" smtClean="0"/>
-              <a:t>commit</a:t>
-            </a:r>
-            <a:r>
-              <a:rPr lang="tr-TR" dirty="0" smtClean="0"/>
-              <a:t> </a:t>
-            </a:r>
-            <a:r>
-              <a:rPr lang="tr-TR" dirty="0" err="1" smtClean="0"/>
-              <a:t>history</a:t>
-            </a:r>
-            <a:r>
-              <a:rPr lang="tr-TR" dirty="0" smtClean="0"/>
-              <a:t> is </a:t>
-            </a:r>
-            <a:r>
-              <a:rPr lang="tr-TR" dirty="0" err="1" smtClean="0"/>
-              <a:t>preserved</a:t>
-            </a:r>
-            <a:r>
-              <a:rPr lang="tr-TR" dirty="0" smtClean="0"/>
-              <a:t>.</a:t>
-            </a:r>
           </a:p>
           <a:p>
             <a:r>
@@ -4440,11 +4429,7 @@
             </a:r>
             <a:r>
               <a:rPr lang="tr-TR" dirty="0" err="1" smtClean="0"/>
-              <a:t>take</a:t>
-            </a:r>
-            <a:r>
-              <a:rPr lang="tr-TR" dirty="0" err="1" smtClean="0"/>
-              <a:t>s</a:t>
+              <a:t>takes</a:t>
             </a:r>
             <a:r>
               <a:rPr lang="tr-TR" dirty="0" smtClean="0"/>
@@ -4996,6 +4981,431 @@
               <a:t>.</a:t>
             </a:r>
             <a:endParaRPr lang="tr-TR"/>
+          </a:p>
+        </p:txBody>
+      </p:sp>
+    </p:spTree>
+  </p:cSld>
+  <p:clrMapOvr>
+    <a:masterClrMapping/>
+  </p:clrMapOvr>
+</p:sld>
+</file>
+
+<file path=ppt/slides/slide16.xml><?xml version="1.0" encoding="utf-8"?>
+<p:sld xmlns:a="http://schemas.openxmlformats.org/drawingml/2006/main" xmlns:r="http://schemas.openxmlformats.org/officeDocument/2006/relationships" xmlns:p="http://schemas.openxmlformats.org/presentationml/2006/main">
+  <p:cSld>
+    <p:spTree>
+      <p:nvGrpSpPr>
+        <p:cNvPr id="1" name=""/>
+        <p:cNvGrpSpPr/>
+        <p:nvPr/>
+      </p:nvGrpSpPr>
+      <p:grpSpPr>
+        <a:xfrm>
+          <a:off x="0" y="0"/>
+          <a:ext cx="0" cy="0"/>
+          <a:chOff x="0" y="0"/>
+          <a:chExt cx="0" cy="0"/>
+        </a:xfrm>
+      </p:grpSpPr>
+      <p:sp>
+        <p:nvSpPr>
+          <p:cNvPr id="2" name="1 Başlık"/>
+          <p:cNvSpPr>
+            <a:spLocks noGrp="1"/>
+          </p:cNvSpPr>
+          <p:nvPr>
+            <p:ph type="title"/>
+          </p:nvPr>
+        </p:nvSpPr>
+        <p:spPr/>
+        <p:txBody>
+          <a:bodyPr/>
+          <a:lstStyle/>
+          <a:p>
+            <a:r>
+              <a:rPr lang="tr-TR" dirty="0" smtClean="0"/>
+              <a:t>JS </a:t>
+            </a:r>
+            <a:r>
+              <a:rPr lang="tr-TR" dirty="0" err="1" smtClean="0"/>
+              <a:t>Errors</a:t>
+            </a:r>
+            <a:endParaRPr lang="tr-TR" dirty="0"/>
+          </a:p>
+        </p:txBody>
+      </p:sp>
+      <p:sp>
+        <p:nvSpPr>
+          <p:cNvPr id="3" name="2 İçerik Yer Tutucusu"/>
+          <p:cNvSpPr>
+            <a:spLocks noGrp="1"/>
+          </p:cNvSpPr>
+          <p:nvPr>
+            <p:ph idx="1"/>
+          </p:nvPr>
+        </p:nvSpPr>
+        <p:spPr/>
+        <p:txBody>
+          <a:bodyPr>
+            <a:normAutofit lnSpcReduction="10000"/>
+          </a:bodyPr>
+          <a:lstStyle/>
+          <a:p>
+            <a:r>
+              <a:rPr lang="tr-TR" b="1" dirty="0" err="1" smtClean="0"/>
+              <a:t>Runtime</a:t>
+            </a:r>
+            <a:r>
+              <a:rPr lang="tr-TR" b="1" dirty="0" smtClean="0"/>
+              <a:t> </a:t>
+            </a:r>
+            <a:r>
+              <a:rPr lang="tr-TR" b="1" dirty="0" err="1" smtClean="0"/>
+              <a:t>Errors</a:t>
+            </a:r>
+            <a:r>
+              <a:rPr lang="tr-TR" b="1" dirty="0" smtClean="0"/>
+              <a:t>: </a:t>
+            </a:r>
+            <a:r>
+              <a:rPr lang="tr-TR" dirty="0" err="1" smtClean="0"/>
+              <a:t>They</a:t>
+            </a:r>
+            <a:r>
+              <a:rPr lang="tr-TR" dirty="0" smtClean="0"/>
+              <a:t> </a:t>
+            </a:r>
+            <a:r>
+              <a:rPr lang="tr-TR" dirty="0" err="1" smtClean="0"/>
+              <a:t>are</a:t>
+            </a:r>
+            <a:r>
+              <a:rPr lang="tr-TR" dirty="0" smtClean="0"/>
+              <a:t> </a:t>
+            </a:r>
+            <a:r>
+              <a:rPr lang="tr-TR" dirty="0" err="1" smtClean="0"/>
+              <a:t>also</a:t>
+            </a:r>
+            <a:r>
+              <a:rPr lang="tr-TR" dirty="0" smtClean="0"/>
+              <a:t> </a:t>
+            </a:r>
+            <a:r>
+              <a:rPr lang="tr-TR" dirty="0" err="1" smtClean="0"/>
+              <a:t>called</a:t>
+            </a:r>
+            <a:r>
+              <a:rPr lang="tr-TR" dirty="0" smtClean="0"/>
+              <a:t> “</a:t>
+            </a:r>
+            <a:r>
+              <a:rPr lang="tr-TR" dirty="0" err="1" smtClean="0"/>
+              <a:t>exceptions</a:t>
+            </a:r>
+            <a:r>
+              <a:rPr lang="tr-TR" dirty="0" smtClean="0"/>
+              <a:t>”. </a:t>
+            </a:r>
+            <a:r>
+              <a:rPr lang="tr-TR" dirty="0" err="1" smtClean="0"/>
+              <a:t>Runtime</a:t>
+            </a:r>
+            <a:r>
+              <a:rPr lang="tr-TR" dirty="0" smtClean="0"/>
+              <a:t> </a:t>
+            </a:r>
+            <a:r>
+              <a:rPr lang="tr-TR" dirty="0" err="1" smtClean="0"/>
+              <a:t>errors</a:t>
+            </a:r>
+            <a:r>
+              <a:rPr lang="tr-TR" dirty="0" smtClean="0"/>
+              <a:t> </a:t>
+            </a:r>
+            <a:r>
+              <a:rPr lang="tr-TR" dirty="0" err="1" smtClean="0"/>
+              <a:t>are</a:t>
+            </a:r>
+            <a:r>
+              <a:rPr lang="tr-TR" dirty="0" smtClean="0"/>
+              <a:t> </a:t>
+            </a:r>
+            <a:r>
+              <a:rPr lang="tr-TR" dirty="0" err="1" smtClean="0"/>
+              <a:t>errors</a:t>
+            </a:r>
+            <a:r>
+              <a:rPr lang="tr-TR" dirty="0" smtClean="0"/>
+              <a:t> </a:t>
+            </a:r>
+            <a:r>
+              <a:rPr lang="tr-TR" dirty="0" err="1" smtClean="0"/>
+              <a:t>that</a:t>
+            </a:r>
+            <a:r>
+              <a:rPr lang="tr-TR" dirty="0" smtClean="0"/>
+              <a:t> </a:t>
+            </a:r>
+            <a:r>
+              <a:rPr lang="tr-TR" dirty="0" err="1" smtClean="0"/>
+              <a:t>seem</a:t>
+            </a:r>
+            <a:r>
+              <a:rPr lang="tr-TR" dirty="0" smtClean="0"/>
+              <a:t> in </a:t>
+            </a:r>
+            <a:r>
+              <a:rPr lang="tr-TR" dirty="0" err="1" smtClean="0"/>
+              <a:t>runtime</a:t>
+            </a:r>
+            <a:r>
+              <a:rPr lang="tr-TR" dirty="0" smtClean="0"/>
+              <a:t> (</a:t>
+            </a:r>
+            <a:r>
+              <a:rPr lang="tr-TR" dirty="0" err="1" smtClean="0"/>
+              <a:t>undefined</a:t>
+            </a:r>
+            <a:r>
+              <a:rPr lang="tr-TR" dirty="0" smtClean="0"/>
+              <a:t> </a:t>
+            </a:r>
+            <a:r>
+              <a:rPr lang="tr-TR" dirty="0" err="1" smtClean="0"/>
+              <a:t>method</a:t>
+            </a:r>
+            <a:r>
+              <a:rPr lang="tr-TR" dirty="0" smtClean="0"/>
+              <a:t> </a:t>
+            </a:r>
+            <a:r>
+              <a:rPr lang="tr-TR" dirty="0" err="1" smtClean="0"/>
+              <a:t>or</a:t>
+            </a:r>
+            <a:r>
+              <a:rPr lang="tr-TR" dirty="0" smtClean="0"/>
+              <a:t> </a:t>
+            </a:r>
+            <a:r>
+              <a:rPr lang="tr-TR" dirty="0" err="1" smtClean="0"/>
+              <a:t>function</a:t>
+            </a:r>
+            <a:r>
+              <a:rPr lang="tr-TR" dirty="0" smtClean="0"/>
+              <a:t> </a:t>
+            </a:r>
+            <a:r>
+              <a:rPr lang="tr-TR" dirty="0" err="1" smtClean="0"/>
+              <a:t>calls</a:t>
+            </a:r>
+            <a:r>
+              <a:rPr lang="tr-TR" dirty="0" smtClean="0"/>
+              <a:t>, </a:t>
+            </a:r>
+            <a:r>
+              <a:rPr lang="tr-TR" dirty="0" err="1" smtClean="0"/>
+              <a:t>etc</a:t>
+            </a:r>
+            <a:r>
+              <a:rPr lang="tr-TR" dirty="0" smtClean="0"/>
+              <a:t>.)</a:t>
+            </a:r>
+          </a:p>
+          <a:p>
+            <a:r>
+              <a:rPr lang="tr-TR" b="1" dirty="0" err="1" smtClean="0"/>
+              <a:t>Syntax</a:t>
+            </a:r>
+            <a:r>
+              <a:rPr lang="tr-TR" b="1" dirty="0" smtClean="0"/>
+              <a:t> </a:t>
+            </a:r>
+            <a:r>
+              <a:rPr lang="tr-TR" b="1" dirty="0" err="1" smtClean="0"/>
+              <a:t>Errors</a:t>
+            </a:r>
+            <a:r>
+              <a:rPr lang="tr-TR" b="1" dirty="0" smtClean="0"/>
+              <a:t>: </a:t>
+            </a:r>
+            <a:r>
+              <a:rPr lang="tr-TR" dirty="0" err="1" smtClean="0"/>
+              <a:t>They</a:t>
+            </a:r>
+            <a:r>
+              <a:rPr lang="tr-TR" dirty="0" smtClean="0"/>
+              <a:t> </a:t>
+            </a:r>
+            <a:r>
+              <a:rPr lang="tr-TR" dirty="0" err="1" smtClean="0"/>
+              <a:t>are</a:t>
+            </a:r>
+            <a:r>
+              <a:rPr lang="tr-TR" dirty="0" smtClean="0"/>
+              <a:t> </a:t>
+            </a:r>
+            <a:r>
+              <a:rPr lang="tr-TR" dirty="0" err="1" smtClean="0"/>
+              <a:t>also</a:t>
+            </a:r>
+            <a:r>
+              <a:rPr lang="tr-TR" dirty="0" smtClean="0"/>
+              <a:t> </a:t>
+            </a:r>
+            <a:r>
+              <a:rPr lang="tr-TR" dirty="0" err="1" smtClean="0"/>
+              <a:t>called</a:t>
+            </a:r>
+            <a:r>
+              <a:rPr lang="tr-TR" dirty="0" smtClean="0"/>
+              <a:t> “</a:t>
+            </a:r>
+            <a:r>
+              <a:rPr lang="tr-TR" dirty="0" err="1" smtClean="0"/>
+              <a:t>parsing</a:t>
+            </a:r>
+            <a:r>
+              <a:rPr lang="tr-TR" dirty="0" smtClean="0"/>
+              <a:t> </a:t>
+            </a:r>
+            <a:r>
+              <a:rPr lang="tr-TR" dirty="0" err="1" smtClean="0"/>
+              <a:t>errors</a:t>
+            </a:r>
+            <a:r>
+              <a:rPr lang="tr-TR" dirty="0" smtClean="0"/>
+              <a:t>”. </a:t>
+            </a:r>
+            <a:r>
+              <a:rPr lang="tr-TR" dirty="0" err="1" smtClean="0"/>
+              <a:t>They</a:t>
+            </a:r>
+            <a:r>
+              <a:rPr lang="tr-TR" dirty="0" smtClean="0"/>
+              <a:t> </a:t>
+            </a:r>
+            <a:r>
+              <a:rPr lang="tr-TR" dirty="0" err="1" smtClean="0"/>
+              <a:t>are</a:t>
+            </a:r>
+            <a:r>
+              <a:rPr lang="tr-TR" dirty="0" smtClean="0"/>
+              <a:t> </a:t>
+            </a:r>
+            <a:r>
+              <a:rPr lang="tr-TR" dirty="0" err="1" smtClean="0"/>
+              <a:t>errors</a:t>
+            </a:r>
+            <a:r>
+              <a:rPr lang="tr-TR" dirty="0" smtClean="0"/>
+              <a:t> </a:t>
+            </a:r>
+            <a:r>
+              <a:rPr lang="tr-TR" dirty="0" err="1" smtClean="0"/>
+              <a:t>that</a:t>
+            </a:r>
+            <a:r>
+              <a:rPr lang="tr-TR" dirty="0" smtClean="0"/>
+              <a:t> </a:t>
+            </a:r>
+            <a:r>
+              <a:rPr lang="en-US" dirty="0" smtClean="0"/>
+              <a:t>error in the syntax of a sequence of characters or </a:t>
+            </a:r>
+            <a:r>
+              <a:rPr lang="en-US" dirty="0" smtClean="0"/>
+              <a:t>tokens</a:t>
+            </a:r>
+            <a:r>
+              <a:rPr lang="tr-TR" dirty="0" smtClean="0"/>
+              <a:t>.</a:t>
+            </a:r>
+          </a:p>
+          <a:p>
+            <a:r>
+              <a:rPr lang="tr-TR" b="1" dirty="0" err="1" smtClean="0"/>
+              <a:t>Complier</a:t>
+            </a:r>
+            <a:r>
+              <a:rPr lang="tr-TR" b="1" dirty="0" smtClean="0"/>
+              <a:t> </a:t>
+            </a:r>
+            <a:r>
+              <a:rPr lang="tr-TR" b="1" dirty="0" err="1" smtClean="0"/>
+              <a:t>Errors</a:t>
+            </a:r>
+            <a:r>
+              <a:rPr lang="tr-TR" b="1" dirty="0" smtClean="0"/>
+              <a:t>: </a:t>
+            </a:r>
+            <a:r>
+              <a:rPr lang="tr-TR" dirty="0" err="1" smtClean="0"/>
+              <a:t>These</a:t>
+            </a:r>
+            <a:r>
+              <a:rPr lang="tr-TR" dirty="0" smtClean="0"/>
+              <a:t> </a:t>
+            </a:r>
+            <a:r>
+              <a:rPr lang="tr-TR" dirty="0" err="1" smtClean="0"/>
+              <a:t>are</a:t>
+            </a:r>
+            <a:r>
+              <a:rPr lang="tr-TR" dirty="0" smtClean="0"/>
+              <a:t> </a:t>
+            </a:r>
+            <a:r>
+              <a:rPr lang="tr-TR" dirty="0" err="1" smtClean="0"/>
+              <a:t>errors</a:t>
+            </a:r>
+            <a:r>
+              <a:rPr lang="tr-TR" dirty="0" smtClean="0"/>
+              <a:t> </a:t>
+            </a:r>
+            <a:r>
+              <a:rPr lang="tr-TR" dirty="0" err="1" smtClean="0"/>
+              <a:t>which</a:t>
+            </a:r>
+            <a:r>
+              <a:rPr lang="tr-TR" dirty="0" smtClean="0"/>
+              <a:t> </a:t>
+            </a:r>
+            <a:r>
+              <a:rPr lang="tr-TR" dirty="0" err="1" smtClean="0"/>
+              <a:t>occurs</a:t>
+            </a:r>
+            <a:r>
+              <a:rPr lang="tr-TR" dirty="0" smtClean="0"/>
+              <a:t> </a:t>
+            </a:r>
+            <a:r>
+              <a:rPr lang="tr-TR" dirty="0" err="1" smtClean="0"/>
+              <a:t>before</a:t>
+            </a:r>
+            <a:r>
+              <a:rPr lang="tr-TR" dirty="0" smtClean="0"/>
+              <a:t> program </a:t>
+            </a:r>
+            <a:r>
+              <a:rPr lang="tr-TR" dirty="0" err="1" smtClean="0"/>
+              <a:t>runs</a:t>
+            </a:r>
+            <a:r>
+              <a:rPr lang="tr-TR" dirty="0" smtClean="0"/>
+              <a:t> at </a:t>
+            </a:r>
+            <a:r>
+              <a:rPr lang="tr-TR" dirty="0" err="1" smtClean="0"/>
+              <a:t>compile</a:t>
+            </a:r>
+            <a:r>
+              <a:rPr lang="tr-TR" dirty="0" smtClean="0"/>
+              <a:t>-time. </a:t>
+            </a:r>
+            <a:endParaRPr lang="tr-TR" b="1" dirty="0"/>
           </a:p>
         </p:txBody>
       </p:sp>

</xml_diff>

<commit_message>
for, while, literal, constructor
</commit_message>
<xml_diff>
--- a/homeworks_musab_sakar.pptx
+++ b/homeworks_musab_sakar.pptx
@@ -21,6 +21,9 @@
     <p:sldId id="269" r:id="rId15"/>
     <p:sldId id="270" r:id="rId16"/>
     <p:sldId id="271" r:id="rId17"/>
+    <p:sldId id="272" r:id="rId18"/>
+    <p:sldId id="273" r:id="rId19"/>
+    <p:sldId id="274" r:id="rId20"/>
   </p:sldIdLst>
   <p:sldSz cx="9144000" cy="6858000" type="screen4x3"/>
   <p:notesSz cx="6858000" cy="9144000"/>
@@ -304,7 +307,7 @@
             <a:fld id="{194CBBFF-B9F9-477E-9B1F-DD9A3FC6F727}" type="datetimeFigureOut">
               <a:rPr lang="tr-TR" smtClean="0"/>
               <a:pPr/>
-              <a:t>4.6.2022</a:t>
+              <a:t>18.6.2022</a:t>
             </a:fld>
             <a:endParaRPr lang="tr-TR"/>
           </a:p>
@@ -471,7 +474,7 @@
             <a:fld id="{194CBBFF-B9F9-477E-9B1F-DD9A3FC6F727}" type="datetimeFigureOut">
               <a:rPr lang="tr-TR" smtClean="0"/>
               <a:pPr/>
-              <a:t>4.6.2022</a:t>
+              <a:t>18.6.2022</a:t>
             </a:fld>
             <a:endParaRPr lang="tr-TR"/>
           </a:p>
@@ -648,7 +651,7 @@
             <a:fld id="{194CBBFF-B9F9-477E-9B1F-DD9A3FC6F727}" type="datetimeFigureOut">
               <a:rPr lang="tr-TR" smtClean="0"/>
               <a:pPr/>
-              <a:t>4.6.2022</a:t>
+              <a:t>18.6.2022</a:t>
             </a:fld>
             <a:endParaRPr lang="tr-TR"/>
           </a:p>
@@ -815,7 +818,7 @@
             <a:fld id="{194CBBFF-B9F9-477E-9B1F-DD9A3FC6F727}" type="datetimeFigureOut">
               <a:rPr lang="tr-TR" smtClean="0"/>
               <a:pPr/>
-              <a:t>4.6.2022</a:t>
+              <a:t>18.6.2022</a:t>
             </a:fld>
             <a:endParaRPr lang="tr-TR"/>
           </a:p>
@@ -1058,7 +1061,7 @@
             <a:fld id="{194CBBFF-B9F9-477E-9B1F-DD9A3FC6F727}" type="datetimeFigureOut">
               <a:rPr lang="tr-TR" smtClean="0"/>
               <a:pPr/>
-              <a:t>4.6.2022</a:t>
+              <a:t>18.6.2022</a:t>
             </a:fld>
             <a:endParaRPr lang="tr-TR"/>
           </a:p>
@@ -1343,7 +1346,7 @@
             <a:fld id="{194CBBFF-B9F9-477E-9B1F-DD9A3FC6F727}" type="datetimeFigureOut">
               <a:rPr lang="tr-TR" smtClean="0"/>
               <a:pPr/>
-              <a:t>4.6.2022</a:t>
+              <a:t>18.6.2022</a:t>
             </a:fld>
             <a:endParaRPr lang="tr-TR"/>
           </a:p>
@@ -1762,7 +1765,7 @@
             <a:fld id="{194CBBFF-B9F9-477E-9B1F-DD9A3FC6F727}" type="datetimeFigureOut">
               <a:rPr lang="tr-TR" smtClean="0"/>
               <a:pPr/>
-              <a:t>4.6.2022</a:t>
+              <a:t>18.6.2022</a:t>
             </a:fld>
             <a:endParaRPr lang="tr-TR"/>
           </a:p>
@@ -1877,7 +1880,7 @@
             <a:fld id="{194CBBFF-B9F9-477E-9B1F-DD9A3FC6F727}" type="datetimeFigureOut">
               <a:rPr lang="tr-TR" smtClean="0"/>
               <a:pPr/>
-              <a:t>4.6.2022</a:t>
+              <a:t>18.6.2022</a:t>
             </a:fld>
             <a:endParaRPr lang="tr-TR"/>
           </a:p>
@@ -1969,7 +1972,7 @@
             <a:fld id="{194CBBFF-B9F9-477E-9B1F-DD9A3FC6F727}" type="datetimeFigureOut">
               <a:rPr lang="tr-TR" smtClean="0"/>
               <a:pPr/>
-              <a:t>4.6.2022</a:t>
+              <a:t>18.6.2022</a:t>
             </a:fld>
             <a:endParaRPr lang="tr-TR"/>
           </a:p>
@@ -2243,7 +2246,7 @@
             <a:fld id="{194CBBFF-B9F9-477E-9B1F-DD9A3FC6F727}" type="datetimeFigureOut">
               <a:rPr lang="tr-TR" smtClean="0"/>
               <a:pPr/>
-              <a:t>4.6.2022</a:t>
+              <a:t>18.6.2022</a:t>
             </a:fld>
             <a:endParaRPr lang="tr-TR"/>
           </a:p>
@@ -2493,7 +2496,7 @@
             <a:fld id="{194CBBFF-B9F9-477E-9B1F-DD9A3FC6F727}" type="datetimeFigureOut">
               <a:rPr lang="tr-TR" smtClean="0"/>
               <a:pPr/>
-              <a:t>4.6.2022</a:t>
+              <a:t>18.6.2022</a:t>
             </a:fld>
             <a:endParaRPr lang="tr-TR"/>
           </a:p>
@@ -2703,7 +2706,7 @@
             <a:fld id="{194CBBFF-B9F9-477E-9B1F-DD9A3FC6F727}" type="datetimeFigureOut">
               <a:rPr lang="tr-TR" smtClean="0"/>
               <a:pPr/>
-              <a:t>4.6.2022</a:t>
+              <a:t>18.6.2022</a:t>
             </a:fld>
             <a:endParaRPr lang="tr-TR"/>
           </a:p>
@@ -5313,11 +5316,7 @@
             </a:r>
             <a:r>
               <a:rPr lang="en-US" dirty="0" smtClean="0"/>
-              <a:t>error in the syntax of a sequence of characters or </a:t>
-            </a:r>
-            <a:r>
-              <a:rPr lang="en-US" dirty="0" smtClean="0"/>
-              <a:t>tokens</a:t>
+              <a:t>error in the syntax of a sequence of characters or tokens</a:t>
             </a:r>
             <a:r>
               <a:rPr lang="tr-TR" dirty="0" smtClean="0"/>
@@ -5406,6 +5405,1264 @@
               <a:t>-time. </a:t>
             </a:r>
             <a:endParaRPr lang="tr-TR" b="1" dirty="0"/>
+          </a:p>
+        </p:txBody>
+      </p:sp>
+    </p:spTree>
+  </p:cSld>
+  <p:clrMapOvr>
+    <a:masterClrMapping/>
+  </p:clrMapOvr>
+</p:sld>
+</file>
+
+<file path=ppt/slides/slide17.xml><?xml version="1.0" encoding="utf-8"?>
+<p:sld xmlns:a="http://schemas.openxmlformats.org/drawingml/2006/main" xmlns:r="http://schemas.openxmlformats.org/officeDocument/2006/relationships" xmlns:p="http://schemas.openxmlformats.org/presentationml/2006/main">
+  <p:cSld>
+    <p:spTree>
+      <p:nvGrpSpPr>
+        <p:cNvPr id="1" name=""/>
+        <p:cNvGrpSpPr/>
+        <p:nvPr/>
+      </p:nvGrpSpPr>
+      <p:grpSpPr>
+        <a:xfrm>
+          <a:off x="0" y="0"/>
+          <a:ext cx="0" cy="0"/>
+          <a:chOff x="0" y="0"/>
+          <a:chExt cx="0" cy="0"/>
+        </a:xfrm>
+      </p:grpSpPr>
+      <p:sp>
+        <p:nvSpPr>
+          <p:cNvPr id="2" name="1 Başlık"/>
+          <p:cNvSpPr>
+            <a:spLocks noGrp="1"/>
+          </p:cNvSpPr>
+          <p:nvPr>
+            <p:ph type="title"/>
+          </p:nvPr>
+        </p:nvSpPr>
+        <p:spPr/>
+        <p:txBody>
+          <a:bodyPr/>
+          <a:lstStyle/>
+          <a:p>
+            <a:r>
+              <a:rPr lang="tr-TR" dirty="0" err="1" smtClean="0"/>
+              <a:t>For</a:t>
+            </a:r>
+            <a:r>
+              <a:rPr lang="tr-TR" dirty="0" smtClean="0"/>
+              <a:t> vs </a:t>
+            </a:r>
+            <a:r>
+              <a:rPr lang="tr-TR" dirty="0" err="1" smtClean="0"/>
+              <a:t>While</a:t>
+            </a:r>
+            <a:endParaRPr lang="tr-TR" dirty="0"/>
+          </a:p>
+        </p:txBody>
+      </p:sp>
+      <p:sp>
+        <p:nvSpPr>
+          <p:cNvPr id="3" name="2 İçerik Yer Tutucusu"/>
+          <p:cNvSpPr>
+            <a:spLocks noGrp="1"/>
+          </p:cNvSpPr>
+          <p:nvPr>
+            <p:ph idx="1"/>
+          </p:nvPr>
+        </p:nvSpPr>
+        <p:spPr/>
+        <p:txBody>
+          <a:bodyPr>
+            <a:normAutofit fontScale="92500" lnSpcReduction="20000"/>
+          </a:bodyPr>
+          <a:lstStyle/>
+          <a:p>
+            <a:r>
+              <a:rPr lang="tr-TR" dirty="0" err="1" smtClean="0"/>
+              <a:t>In</a:t>
+            </a:r>
+            <a:r>
+              <a:rPr lang="tr-TR" dirty="0" smtClean="0"/>
+              <a:t> </a:t>
+            </a:r>
+            <a:r>
+              <a:rPr lang="tr-TR" dirty="0" err="1" smtClean="0"/>
+              <a:t>for</a:t>
+            </a:r>
+            <a:r>
+              <a:rPr lang="tr-TR" dirty="0" smtClean="0"/>
+              <a:t> </a:t>
+            </a:r>
+            <a:r>
+              <a:rPr lang="tr-TR" dirty="0" err="1" smtClean="0"/>
+              <a:t>loop</a:t>
+            </a:r>
+            <a:r>
+              <a:rPr lang="tr-TR" dirty="0" smtClean="0"/>
+              <a:t>, </a:t>
+            </a:r>
+            <a:r>
+              <a:rPr lang="tr-TR" dirty="0" err="1" smtClean="0"/>
+              <a:t>we</a:t>
+            </a:r>
+            <a:r>
+              <a:rPr lang="tr-TR" dirty="0" smtClean="0"/>
+              <a:t> </a:t>
+            </a:r>
+            <a:r>
+              <a:rPr lang="tr-TR" dirty="0" err="1" smtClean="0"/>
+              <a:t>need</a:t>
+            </a:r>
+            <a:r>
+              <a:rPr lang="tr-TR" dirty="0" smtClean="0"/>
+              <a:t> </a:t>
+            </a:r>
+            <a:r>
+              <a:rPr lang="tr-TR" dirty="0" err="1" smtClean="0"/>
+              <a:t>to</a:t>
+            </a:r>
+            <a:r>
+              <a:rPr lang="tr-TR" dirty="0" smtClean="0"/>
+              <a:t> define </a:t>
+            </a:r>
+            <a:r>
+              <a:rPr lang="tr-TR" dirty="0" err="1" smtClean="0"/>
+              <a:t>the</a:t>
+            </a:r>
+            <a:r>
+              <a:rPr lang="tr-TR" dirty="0" smtClean="0"/>
+              <a:t> </a:t>
+            </a:r>
+            <a:r>
+              <a:rPr lang="tr-TR" dirty="0" err="1" smtClean="0"/>
+              <a:t>number</a:t>
+            </a:r>
+            <a:r>
+              <a:rPr lang="tr-TR" dirty="0" smtClean="0"/>
+              <a:t> of </a:t>
+            </a:r>
+            <a:r>
+              <a:rPr lang="tr-TR" dirty="0" err="1" smtClean="0"/>
+              <a:t>iterations</a:t>
+            </a:r>
+            <a:r>
+              <a:rPr lang="tr-TR" dirty="0" smtClean="0"/>
+              <a:t> </a:t>
+            </a:r>
+            <a:r>
+              <a:rPr lang="tr-TR" dirty="0" smtClean="0"/>
+              <a:t>but in </a:t>
+            </a:r>
+            <a:r>
+              <a:rPr lang="tr-TR" dirty="0" err="1" smtClean="0"/>
+              <a:t>while</a:t>
+            </a:r>
+            <a:r>
+              <a:rPr lang="tr-TR" dirty="0" smtClean="0"/>
+              <a:t> </a:t>
+            </a:r>
+            <a:r>
+              <a:rPr lang="tr-TR" dirty="0" err="1" smtClean="0"/>
+              <a:t>loop</a:t>
+            </a:r>
+            <a:r>
+              <a:rPr lang="tr-TR" dirty="0" smtClean="0"/>
+              <a:t>, </a:t>
+            </a:r>
+            <a:r>
+              <a:rPr lang="tr-TR" dirty="0" err="1" smtClean="0"/>
+              <a:t>we</a:t>
+            </a:r>
+            <a:r>
+              <a:rPr lang="tr-TR" dirty="0" smtClean="0"/>
+              <a:t> can </a:t>
+            </a:r>
+            <a:r>
+              <a:rPr lang="tr-TR" dirty="0" err="1" smtClean="0"/>
+              <a:t>make</a:t>
+            </a:r>
+            <a:r>
+              <a:rPr lang="tr-TR" dirty="0" smtClean="0"/>
+              <a:t> </a:t>
+            </a:r>
+            <a:r>
+              <a:rPr lang="tr-TR" dirty="0" err="1" smtClean="0"/>
+              <a:t>infinite</a:t>
+            </a:r>
+            <a:r>
+              <a:rPr lang="tr-TR" dirty="0" smtClean="0"/>
+              <a:t> </a:t>
+            </a:r>
+            <a:r>
+              <a:rPr lang="tr-TR" dirty="0" err="1" smtClean="0"/>
+              <a:t>loop</a:t>
+            </a:r>
+            <a:r>
+              <a:rPr lang="tr-TR" dirty="0" smtClean="0"/>
+              <a:t> </a:t>
+            </a:r>
+            <a:r>
+              <a:rPr lang="tr-TR" dirty="0" err="1" smtClean="0"/>
+              <a:t>if</a:t>
+            </a:r>
+            <a:r>
+              <a:rPr lang="tr-TR" dirty="0" smtClean="0"/>
+              <a:t> </a:t>
+            </a:r>
+            <a:r>
+              <a:rPr lang="tr-TR" dirty="0" err="1" smtClean="0"/>
+              <a:t>we</a:t>
+            </a:r>
+            <a:r>
+              <a:rPr lang="tr-TR" dirty="0" smtClean="0"/>
+              <a:t> </a:t>
+            </a:r>
+            <a:r>
+              <a:rPr lang="tr-TR" dirty="0" err="1" smtClean="0"/>
+              <a:t>want</a:t>
+            </a:r>
+            <a:r>
+              <a:rPr lang="tr-TR" dirty="0" smtClean="0"/>
+              <a:t>. </a:t>
+            </a:r>
+            <a:r>
+              <a:rPr lang="tr-TR" dirty="0" err="1" smtClean="0"/>
+              <a:t>It</a:t>
+            </a:r>
+            <a:r>
+              <a:rPr lang="tr-TR" dirty="0" smtClean="0"/>
+              <a:t> can be </a:t>
+            </a:r>
+            <a:r>
+              <a:rPr lang="tr-TR" dirty="0" err="1" smtClean="0"/>
+              <a:t>useful</a:t>
+            </a:r>
+            <a:r>
+              <a:rPr lang="tr-TR" dirty="0" smtClean="0"/>
+              <a:t> </a:t>
+            </a:r>
+            <a:r>
+              <a:rPr lang="tr-TR" dirty="0" err="1" smtClean="0"/>
+              <a:t>when</a:t>
+            </a:r>
+            <a:r>
+              <a:rPr lang="tr-TR" dirty="0" smtClean="0"/>
+              <a:t> </a:t>
+            </a:r>
+            <a:r>
+              <a:rPr lang="tr-TR" dirty="0" err="1" smtClean="0"/>
+              <a:t>we</a:t>
+            </a:r>
+            <a:r>
+              <a:rPr lang="tr-TR" dirty="0" smtClean="0"/>
+              <a:t> </a:t>
+            </a:r>
+            <a:r>
+              <a:rPr lang="tr-TR" dirty="0" err="1" smtClean="0"/>
+              <a:t>don’t</a:t>
+            </a:r>
+            <a:r>
+              <a:rPr lang="tr-TR" dirty="0" smtClean="0"/>
+              <a:t> </a:t>
+            </a:r>
+            <a:r>
+              <a:rPr lang="tr-TR" dirty="0" err="1" smtClean="0"/>
+              <a:t>now</a:t>
+            </a:r>
+            <a:r>
+              <a:rPr lang="tr-TR" dirty="0" smtClean="0"/>
+              <a:t> </a:t>
+            </a:r>
+            <a:r>
+              <a:rPr lang="tr-TR" dirty="0" err="1" smtClean="0"/>
+              <a:t>how</a:t>
+            </a:r>
+            <a:r>
+              <a:rPr lang="tr-TR" dirty="0" smtClean="0"/>
+              <a:t> </a:t>
+            </a:r>
+            <a:r>
+              <a:rPr lang="tr-TR" dirty="0" err="1" smtClean="0"/>
+              <a:t>many</a:t>
+            </a:r>
+            <a:r>
+              <a:rPr lang="tr-TR" dirty="0" smtClean="0"/>
+              <a:t> </a:t>
+            </a:r>
+            <a:r>
+              <a:rPr lang="tr-TR" dirty="0" err="1" smtClean="0"/>
+              <a:t>iterations</a:t>
+            </a:r>
+            <a:r>
+              <a:rPr lang="tr-TR" dirty="0" smtClean="0"/>
+              <a:t> </a:t>
+            </a:r>
+            <a:r>
+              <a:rPr lang="tr-TR" dirty="0" err="1" smtClean="0"/>
+              <a:t>needed</a:t>
+            </a:r>
+            <a:r>
+              <a:rPr lang="tr-TR" dirty="0" smtClean="0"/>
+              <a:t> </a:t>
+            </a:r>
+            <a:r>
+              <a:rPr lang="tr-TR" dirty="0" err="1" smtClean="0"/>
+              <a:t>until</a:t>
+            </a:r>
+            <a:r>
+              <a:rPr lang="tr-TR" dirty="0" smtClean="0"/>
+              <a:t> </a:t>
+            </a:r>
+            <a:r>
+              <a:rPr lang="tr-TR" dirty="0" err="1" smtClean="0"/>
+              <a:t>process</a:t>
+            </a:r>
+            <a:r>
+              <a:rPr lang="tr-TR" dirty="0" smtClean="0"/>
+              <a:t> done </a:t>
+            </a:r>
+            <a:r>
+              <a:rPr lang="tr-TR" dirty="0" err="1" smtClean="0"/>
+              <a:t>or</a:t>
+            </a:r>
+            <a:r>
+              <a:rPr lang="tr-TR" dirty="0" smtClean="0"/>
+              <a:t> </a:t>
+            </a:r>
+            <a:r>
+              <a:rPr lang="tr-TR" dirty="0" err="1" smtClean="0"/>
+              <a:t>when</a:t>
+            </a:r>
+            <a:r>
+              <a:rPr lang="tr-TR" dirty="0" smtClean="0"/>
+              <a:t> </a:t>
+            </a:r>
+            <a:r>
+              <a:rPr lang="tr-TR" dirty="0" err="1" smtClean="0"/>
+              <a:t>the</a:t>
+            </a:r>
+            <a:r>
+              <a:rPr lang="tr-TR" dirty="0" smtClean="0"/>
+              <a:t> </a:t>
+            </a:r>
+            <a:r>
+              <a:rPr lang="tr-TR" dirty="0" err="1" smtClean="0"/>
+              <a:t>condition</a:t>
+            </a:r>
+            <a:r>
+              <a:rPr lang="tr-TR" dirty="0" smtClean="0"/>
+              <a:t> is not a </a:t>
+            </a:r>
+            <a:r>
+              <a:rPr lang="tr-TR" dirty="0" err="1" smtClean="0"/>
+              <a:t>number</a:t>
+            </a:r>
+            <a:r>
+              <a:rPr lang="tr-TR" dirty="0" smtClean="0"/>
+              <a:t>. But </a:t>
+            </a:r>
+            <a:r>
+              <a:rPr lang="tr-TR" dirty="0" err="1" smtClean="0"/>
+              <a:t>if</a:t>
+            </a:r>
+            <a:r>
+              <a:rPr lang="tr-TR" dirty="0" smtClean="0"/>
+              <a:t> </a:t>
+            </a:r>
+            <a:r>
+              <a:rPr lang="tr-TR" dirty="0" err="1" smtClean="0"/>
+              <a:t>we</a:t>
+            </a:r>
+            <a:r>
+              <a:rPr lang="tr-TR" dirty="0" smtClean="0"/>
+              <a:t> </a:t>
+            </a:r>
+            <a:r>
+              <a:rPr lang="tr-TR" dirty="0" err="1" smtClean="0"/>
+              <a:t>want</a:t>
+            </a:r>
+            <a:r>
+              <a:rPr lang="tr-TR" dirty="0" smtClean="0"/>
+              <a:t> </a:t>
+            </a:r>
+            <a:r>
+              <a:rPr lang="tr-TR" dirty="0" err="1" smtClean="0"/>
+              <a:t>limited</a:t>
+            </a:r>
+            <a:r>
+              <a:rPr lang="tr-TR" dirty="0" smtClean="0"/>
+              <a:t> </a:t>
+            </a:r>
+            <a:r>
+              <a:rPr lang="tr-TR" dirty="0" err="1" smtClean="0"/>
+              <a:t>number</a:t>
+            </a:r>
+            <a:r>
+              <a:rPr lang="tr-TR" dirty="0" smtClean="0"/>
+              <a:t> of </a:t>
+            </a:r>
+            <a:r>
+              <a:rPr lang="tr-TR" dirty="0" err="1" smtClean="0"/>
+              <a:t>iterations</a:t>
+            </a:r>
+            <a:r>
+              <a:rPr lang="tr-TR" dirty="0" smtClean="0"/>
+              <a:t>, </a:t>
+            </a:r>
+            <a:r>
+              <a:rPr lang="tr-TR" dirty="0" err="1" smtClean="0"/>
+              <a:t>for</a:t>
+            </a:r>
+            <a:r>
+              <a:rPr lang="tr-TR" dirty="0" smtClean="0"/>
+              <a:t> </a:t>
+            </a:r>
+            <a:r>
+              <a:rPr lang="tr-TR" dirty="0" err="1" smtClean="0"/>
+              <a:t>loop</a:t>
+            </a:r>
+            <a:r>
+              <a:rPr lang="tr-TR" dirty="0" smtClean="0"/>
+              <a:t> is </a:t>
+            </a:r>
+            <a:r>
+              <a:rPr lang="tr-TR" dirty="0" err="1" smtClean="0"/>
+              <a:t>more</a:t>
+            </a:r>
+            <a:r>
+              <a:rPr lang="tr-TR" dirty="0" smtClean="0"/>
+              <a:t> </a:t>
+            </a:r>
+            <a:r>
+              <a:rPr lang="tr-TR" dirty="0" err="1" smtClean="0"/>
+              <a:t>practical</a:t>
+            </a:r>
+            <a:r>
+              <a:rPr lang="tr-TR" dirty="0" smtClean="0"/>
+              <a:t> </a:t>
+            </a:r>
+            <a:r>
+              <a:rPr lang="tr-TR" dirty="0" err="1" smtClean="0"/>
+              <a:t>because</a:t>
+            </a:r>
+            <a:r>
+              <a:rPr lang="tr-TR" dirty="0" smtClean="0"/>
+              <a:t> </a:t>
+            </a:r>
+            <a:r>
+              <a:rPr lang="tr-TR" dirty="0" err="1" smtClean="0"/>
+              <a:t>we</a:t>
+            </a:r>
+            <a:r>
+              <a:rPr lang="tr-TR" dirty="0" smtClean="0"/>
+              <a:t> can </a:t>
+            </a:r>
+            <a:r>
+              <a:rPr lang="tr-TR" dirty="0" smtClean="0"/>
+              <a:t>define </a:t>
+            </a:r>
+            <a:r>
+              <a:rPr lang="tr-TR" dirty="0" err="1" smtClean="0"/>
+              <a:t>initialization</a:t>
+            </a:r>
+            <a:r>
+              <a:rPr lang="tr-TR" dirty="0" smtClean="0"/>
+              <a:t>, </a:t>
+            </a:r>
+            <a:r>
+              <a:rPr lang="tr-TR" dirty="0" err="1" smtClean="0"/>
+              <a:t>condition</a:t>
+            </a:r>
+            <a:r>
+              <a:rPr lang="tr-TR" dirty="0" smtClean="0"/>
+              <a:t> </a:t>
+            </a:r>
+            <a:r>
+              <a:rPr lang="tr-TR" dirty="0" err="1" smtClean="0"/>
+              <a:t>and</a:t>
+            </a:r>
+            <a:r>
+              <a:rPr lang="tr-TR" dirty="0" smtClean="0"/>
+              <a:t> </a:t>
+            </a:r>
+            <a:r>
+              <a:rPr lang="tr-TR" dirty="0" err="1" smtClean="0"/>
+              <a:t>increment</a:t>
+            </a:r>
+            <a:r>
+              <a:rPr lang="tr-TR" dirty="0" smtClean="0"/>
+              <a:t> in </a:t>
+            </a:r>
+            <a:r>
+              <a:rPr lang="tr-TR" dirty="0" err="1" smtClean="0"/>
+              <a:t>single</a:t>
+            </a:r>
+            <a:r>
+              <a:rPr lang="tr-TR" dirty="0" smtClean="0"/>
+              <a:t> </a:t>
+            </a:r>
+            <a:r>
+              <a:rPr lang="tr-TR" dirty="0" err="1" smtClean="0"/>
+              <a:t>line</a:t>
+            </a:r>
+            <a:r>
+              <a:rPr lang="tr-TR" dirty="0" smtClean="0"/>
+              <a:t>.</a:t>
+            </a:r>
+          </a:p>
+          <a:p>
+            <a:r>
+              <a:rPr lang="tr-TR" dirty="0" smtClean="0"/>
+              <a:t> </a:t>
+            </a:r>
+            <a:r>
+              <a:rPr lang="tr-TR" dirty="0" err="1" smtClean="0"/>
+              <a:t>Also</a:t>
+            </a:r>
+            <a:r>
+              <a:rPr lang="tr-TR" dirty="0" smtClean="0"/>
+              <a:t> </a:t>
+            </a:r>
+            <a:r>
+              <a:rPr lang="tr-TR" dirty="0" err="1" smtClean="0"/>
+              <a:t>for</a:t>
+            </a:r>
+            <a:r>
+              <a:rPr lang="tr-TR" dirty="0" smtClean="0"/>
+              <a:t> </a:t>
+            </a:r>
+            <a:r>
+              <a:rPr lang="tr-TR" dirty="0" err="1" smtClean="0"/>
+              <a:t>loop</a:t>
+            </a:r>
+            <a:r>
+              <a:rPr lang="tr-TR" dirty="0" smtClean="0"/>
+              <a:t> is </a:t>
+            </a:r>
+            <a:r>
+              <a:rPr lang="tr-TR" dirty="0" err="1" smtClean="0"/>
+              <a:t>more</a:t>
+            </a:r>
+            <a:r>
+              <a:rPr lang="tr-TR" dirty="0" smtClean="0"/>
+              <a:t> </a:t>
+            </a:r>
+            <a:r>
+              <a:rPr lang="tr-TR" dirty="0" err="1" smtClean="0"/>
+              <a:t>useful</a:t>
+            </a:r>
+            <a:r>
+              <a:rPr lang="tr-TR" dirty="0" smtClean="0"/>
+              <a:t> </a:t>
+            </a:r>
+            <a:r>
+              <a:rPr lang="tr-TR" dirty="0" err="1" smtClean="0"/>
+              <a:t>if</a:t>
+            </a:r>
+            <a:r>
+              <a:rPr lang="tr-TR" dirty="0" smtClean="0"/>
+              <a:t> </a:t>
+            </a:r>
+            <a:r>
+              <a:rPr lang="tr-TR" dirty="0" err="1" smtClean="0"/>
+              <a:t>we</a:t>
+            </a:r>
+            <a:r>
+              <a:rPr lang="tr-TR" dirty="0" smtClean="0"/>
+              <a:t> </a:t>
+            </a:r>
+            <a:r>
+              <a:rPr lang="tr-TR" dirty="0" err="1" smtClean="0"/>
+              <a:t>process</a:t>
+            </a:r>
+            <a:r>
+              <a:rPr lang="tr-TR" dirty="0" smtClean="0"/>
+              <a:t> </a:t>
+            </a:r>
+            <a:r>
+              <a:rPr lang="tr-TR" dirty="0" err="1" smtClean="0"/>
+              <a:t>with</a:t>
+            </a:r>
+            <a:r>
+              <a:rPr lang="tr-TR" dirty="0" smtClean="0"/>
+              <a:t> </a:t>
+            </a:r>
+            <a:r>
+              <a:rPr lang="tr-TR" dirty="0" err="1" smtClean="0"/>
+              <a:t>elements</a:t>
+            </a:r>
+            <a:r>
+              <a:rPr lang="tr-TR" dirty="0" smtClean="0"/>
+              <a:t> of an </a:t>
+            </a:r>
+            <a:r>
+              <a:rPr lang="tr-TR" dirty="0" err="1" smtClean="0"/>
+              <a:t>array</a:t>
+            </a:r>
+            <a:r>
+              <a:rPr lang="tr-TR" dirty="0" smtClean="0"/>
+              <a:t> </a:t>
+            </a:r>
+            <a:r>
+              <a:rPr lang="tr-TR" dirty="0" err="1" smtClean="0"/>
+              <a:t>or</a:t>
+            </a:r>
+            <a:r>
+              <a:rPr lang="tr-TR" dirty="0" smtClean="0"/>
+              <a:t> </a:t>
+            </a:r>
+            <a:r>
+              <a:rPr lang="tr-TR" dirty="0" err="1" smtClean="0"/>
+              <a:t>properties</a:t>
+            </a:r>
+            <a:r>
+              <a:rPr lang="tr-TR" dirty="0" smtClean="0"/>
+              <a:t> of an </a:t>
+            </a:r>
+            <a:r>
+              <a:rPr lang="tr-TR" dirty="0" err="1" smtClean="0"/>
+              <a:t>object</a:t>
+            </a:r>
+            <a:r>
+              <a:rPr lang="tr-TR" dirty="0" smtClean="0"/>
+              <a:t>.</a:t>
+            </a:r>
+            <a:endParaRPr lang="tr-TR" dirty="0" smtClean="0"/>
+          </a:p>
+          <a:p>
+            <a:endParaRPr lang="tr-TR" dirty="0"/>
+          </a:p>
+        </p:txBody>
+      </p:sp>
+    </p:spTree>
+  </p:cSld>
+  <p:clrMapOvr>
+    <a:masterClrMapping/>
+  </p:clrMapOvr>
+</p:sld>
+</file>
+
+<file path=ppt/slides/slide18.xml><?xml version="1.0" encoding="utf-8"?>
+<p:sld xmlns:a="http://schemas.openxmlformats.org/drawingml/2006/main" xmlns:r="http://schemas.openxmlformats.org/officeDocument/2006/relationships" xmlns:p="http://schemas.openxmlformats.org/presentationml/2006/main">
+  <p:cSld>
+    <p:spTree>
+      <p:nvGrpSpPr>
+        <p:cNvPr id="1" name=""/>
+        <p:cNvGrpSpPr/>
+        <p:nvPr/>
+      </p:nvGrpSpPr>
+      <p:grpSpPr>
+        <a:xfrm>
+          <a:off x="0" y="0"/>
+          <a:ext cx="0" cy="0"/>
+          <a:chOff x="0" y="0"/>
+          <a:chExt cx="0" cy="0"/>
+        </a:xfrm>
+      </p:grpSpPr>
+      <p:sp>
+        <p:nvSpPr>
+          <p:cNvPr id="2" name="1 Başlık"/>
+          <p:cNvSpPr>
+            <a:spLocks noGrp="1"/>
+          </p:cNvSpPr>
+          <p:nvPr>
+            <p:ph type="title"/>
+          </p:nvPr>
+        </p:nvSpPr>
+        <p:spPr/>
+        <p:txBody>
+          <a:bodyPr>
+            <a:normAutofit/>
+          </a:bodyPr>
+          <a:lstStyle/>
+          <a:p>
+            <a:r>
+              <a:rPr lang="tr-TR" dirty="0" err="1" smtClean="0"/>
+              <a:t>Literal</a:t>
+            </a:r>
+            <a:r>
+              <a:rPr lang="tr-TR" dirty="0" smtClean="0"/>
+              <a:t> </a:t>
+            </a:r>
+            <a:r>
+              <a:rPr lang="tr-TR" dirty="0" err="1" smtClean="0"/>
+              <a:t>Syntax</a:t>
+            </a:r>
+            <a:r>
+              <a:rPr lang="tr-TR" dirty="0" smtClean="0"/>
+              <a:t> </a:t>
+            </a:r>
+            <a:r>
+              <a:rPr lang="tr-TR" dirty="0" smtClean="0"/>
+              <a:t>vs </a:t>
+            </a:r>
+            <a:r>
+              <a:rPr lang="tr-TR" dirty="0" err="1" smtClean="0"/>
+              <a:t>Constructor</a:t>
+            </a:r>
+            <a:r>
+              <a:rPr lang="tr-TR" dirty="0" smtClean="0"/>
+              <a:t> </a:t>
+            </a:r>
+            <a:r>
+              <a:rPr lang="tr-TR" dirty="0" err="1" smtClean="0"/>
+              <a:t>Syntax</a:t>
+            </a:r>
+            <a:endParaRPr lang="tr-TR" dirty="0"/>
+          </a:p>
+        </p:txBody>
+      </p:sp>
+      <p:sp>
+        <p:nvSpPr>
+          <p:cNvPr id="3" name="2 İçerik Yer Tutucusu"/>
+          <p:cNvSpPr>
+            <a:spLocks noGrp="1"/>
+          </p:cNvSpPr>
+          <p:nvPr>
+            <p:ph idx="1"/>
+          </p:nvPr>
+        </p:nvSpPr>
+        <p:spPr/>
+        <p:txBody>
+          <a:bodyPr/>
+          <a:lstStyle/>
+          <a:p>
+            <a:r>
+              <a:rPr lang="tr-TR" dirty="0" err="1" smtClean="0"/>
+              <a:t>There</a:t>
+            </a:r>
+            <a:r>
+              <a:rPr lang="tr-TR" dirty="0" smtClean="0"/>
+              <a:t> </a:t>
+            </a:r>
+            <a:r>
+              <a:rPr lang="tr-TR" dirty="0" err="1" smtClean="0"/>
+              <a:t>are</a:t>
+            </a:r>
+            <a:r>
+              <a:rPr lang="tr-TR" dirty="0" smtClean="0"/>
+              <a:t> </a:t>
+            </a:r>
+            <a:r>
+              <a:rPr lang="tr-TR" dirty="0" err="1" smtClean="0"/>
+              <a:t>two</a:t>
+            </a:r>
+            <a:r>
+              <a:rPr lang="tr-TR" dirty="0" smtClean="0"/>
+              <a:t> </a:t>
+            </a:r>
+            <a:r>
+              <a:rPr lang="tr-TR" dirty="0" err="1" smtClean="0"/>
+              <a:t>main</a:t>
+            </a:r>
+            <a:r>
+              <a:rPr lang="tr-TR" dirty="0" smtClean="0"/>
+              <a:t> </a:t>
+            </a:r>
+            <a:r>
+              <a:rPr lang="tr-TR" dirty="0" err="1" smtClean="0"/>
+              <a:t>ways</a:t>
+            </a:r>
+            <a:r>
+              <a:rPr lang="tr-TR" dirty="0" smtClean="0"/>
+              <a:t> </a:t>
+            </a:r>
+            <a:r>
+              <a:rPr lang="tr-TR" dirty="0" err="1" smtClean="0"/>
+              <a:t>to</a:t>
+            </a:r>
+            <a:r>
+              <a:rPr lang="tr-TR" dirty="0" smtClean="0"/>
+              <a:t> </a:t>
+            </a:r>
+            <a:r>
+              <a:rPr lang="tr-TR" dirty="0" err="1" smtClean="0"/>
+              <a:t>declare</a:t>
+            </a:r>
+            <a:r>
+              <a:rPr lang="tr-TR" dirty="0" smtClean="0"/>
+              <a:t> an </a:t>
+            </a:r>
+            <a:r>
+              <a:rPr lang="tr-TR" dirty="0" err="1" smtClean="0"/>
+              <a:t>array</a:t>
+            </a:r>
+            <a:r>
+              <a:rPr lang="tr-TR" dirty="0" smtClean="0"/>
+              <a:t> </a:t>
+            </a:r>
+            <a:r>
+              <a:rPr lang="tr-TR" dirty="0" err="1" smtClean="0"/>
+              <a:t>which</a:t>
+            </a:r>
+            <a:r>
+              <a:rPr lang="tr-TR" dirty="0" smtClean="0"/>
+              <a:t> </a:t>
+            </a:r>
+            <a:r>
+              <a:rPr lang="tr-TR" dirty="0" err="1" smtClean="0"/>
+              <a:t>are</a:t>
+            </a:r>
+            <a:r>
+              <a:rPr lang="tr-TR" dirty="0" smtClean="0"/>
+              <a:t> </a:t>
+            </a:r>
+            <a:r>
+              <a:rPr lang="tr-TR" dirty="0" err="1" smtClean="0"/>
+              <a:t>literal</a:t>
+            </a:r>
+            <a:r>
+              <a:rPr lang="tr-TR" dirty="0" smtClean="0"/>
+              <a:t> </a:t>
+            </a:r>
+            <a:r>
+              <a:rPr lang="tr-TR" dirty="0" err="1" smtClean="0"/>
+              <a:t>syntax</a:t>
+            </a:r>
+            <a:r>
+              <a:rPr lang="tr-TR" dirty="0" smtClean="0"/>
+              <a:t>( </a:t>
+            </a:r>
+            <a:r>
+              <a:rPr lang="tr-TR" dirty="0" err="1" smtClean="0"/>
+              <a:t>array</a:t>
+            </a:r>
+            <a:r>
+              <a:rPr lang="tr-TR" dirty="0" smtClean="0"/>
+              <a:t>=[],</a:t>
+            </a:r>
+            <a:r>
+              <a:rPr lang="tr-TR" dirty="0" err="1" smtClean="0"/>
+              <a:t>etc</a:t>
+            </a:r>
+            <a:r>
+              <a:rPr lang="tr-TR" dirty="0" smtClean="0"/>
+              <a:t>.) </a:t>
+            </a:r>
+            <a:r>
+              <a:rPr lang="tr-TR" dirty="0" err="1" smtClean="0"/>
+              <a:t>and</a:t>
+            </a:r>
+            <a:r>
+              <a:rPr lang="tr-TR" dirty="0" smtClean="0"/>
+              <a:t> </a:t>
+            </a:r>
+            <a:r>
+              <a:rPr lang="tr-TR" dirty="0" err="1" smtClean="0"/>
+              <a:t>constructor</a:t>
+            </a:r>
+            <a:r>
+              <a:rPr lang="tr-TR" dirty="0" smtClean="0"/>
+              <a:t> </a:t>
+            </a:r>
+            <a:r>
+              <a:rPr lang="tr-TR" dirty="0" err="1" smtClean="0"/>
+              <a:t>syntax</a:t>
+            </a:r>
+            <a:r>
+              <a:rPr lang="tr-TR" dirty="0" smtClean="0"/>
+              <a:t>(</a:t>
+            </a:r>
+            <a:r>
+              <a:rPr lang="tr-TR" dirty="0" err="1" smtClean="0"/>
+              <a:t>array</a:t>
+            </a:r>
+            <a:r>
+              <a:rPr lang="tr-TR" dirty="0" smtClean="0"/>
+              <a:t> = </a:t>
+            </a:r>
+            <a:r>
+              <a:rPr lang="tr-TR" dirty="0" err="1" smtClean="0"/>
+              <a:t>new</a:t>
+            </a:r>
+            <a:r>
+              <a:rPr lang="tr-TR" dirty="0" smtClean="0"/>
+              <a:t> </a:t>
+            </a:r>
+            <a:r>
+              <a:rPr lang="tr-TR" dirty="0" err="1" smtClean="0"/>
+              <a:t>Array</a:t>
+            </a:r>
+            <a:r>
+              <a:rPr lang="tr-TR" dirty="0" smtClean="0"/>
+              <a:t>(),</a:t>
+            </a:r>
+            <a:r>
+              <a:rPr lang="tr-TR" dirty="0" err="1" smtClean="0"/>
+              <a:t>etc</a:t>
+            </a:r>
+            <a:r>
+              <a:rPr lang="tr-TR" dirty="0" smtClean="0"/>
+              <a:t>.).</a:t>
+            </a:r>
+          </a:p>
+          <a:p>
+            <a:r>
+              <a:rPr lang="tr-TR" dirty="0" smtClean="0"/>
+              <a:t>L</a:t>
+            </a:r>
+            <a:r>
+              <a:rPr lang="en-US" dirty="0" err="1" smtClean="0"/>
+              <a:t>iteral</a:t>
+            </a:r>
+            <a:r>
+              <a:rPr lang="en-US" dirty="0" smtClean="0"/>
+              <a:t> syntax </a:t>
+            </a:r>
+            <a:r>
+              <a:rPr lang="en-US" dirty="0" smtClean="0"/>
+              <a:t>is preferred over constructor </a:t>
+            </a:r>
+            <a:r>
+              <a:rPr lang="en-US" dirty="0" smtClean="0"/>
+              <a:t>syntax</a:t>
+            </a:r>
+            <a:r>
+              <a:rPr lang="tr-TR" dirty="0" smtClean="0"/>
+              <a:t> </a:t>
+            </a:r>
+            <a:r>
+              <a:rPr lang="tr-TR" dirty="0" err="1" smtClean="0"/>
+              <a:t>from</a:t>
+            </a:r>
+            <a:r>
+              <a:rPr lang="tr-TR" dirty="0" smtClean="0"/>
+              <a:t> </a:t>
+            </a:r>
+            <a:r>
+              <a:rPr lang="tr-TR" dirty="0" err="1" smtClean="0"/>
+              <a:t>by</a:t>
+            </a:r>
+            <a:r>
+              <a:rPr lang="tr-TR" dirty="0" smtClean="0"/>
+              <a:t> </a:t>
+            </a:r>
+            <a:r>
+              <a:rPr lang="tr-TR" dirty="0" err="1" smtClean="0"/>
+              <a:t>most</a:t>
+            </a:r>
+            <a:r>
+              <a:rPr lang="tr-TR" dirty="0" smtClean="0"/>
+              <a:t> </a:t>
+            </a:r>
+            <a:r>
+              <a:rPr lang="tr-TR" dirty="0" err="1" smtClean="0"/>
+              <a:t>programmers</a:t>
+            </a:r>
+            <a:r>
+              <a:rPr lang="tr-TR" dirty="0" smtClean="0"/>
+              <a:t>.</a:t>
+            </a:r>
+            <a:endParaRPr lang="tr-TR" dirty="0" smtClean="0"/>
+          </a:p>
+          <a:p>
+            <a:r>
+              <a:rPr lang="tr-TR" dirty="0" err="1" smtClean="0"/>
+              <a:t>L</a:t>
+            </a:r>
+            <a:r>
+              <a:rPr lang="tr-TR" dirty="0" err="1" smtClean="0"/>
+              <a:t>iteral</a:t>
+            </a:r>
+            <a:r>
+              <a:rPr lang="tr-TR" dirty="0" smtClean="0"/>
+              <a:t> </a:t>
+            </a:r>
+            <a:r>
+              <a:rPr lang="tr-TR" dirty="0" err="1" smtClean="0"/>
+              <a:t>syntax</a:t>
+            </a:r>
+            <a:r>
+              <a:rPr lang="tr-TR" dirty="0" smtClean="0"/>
+              <a:t> is </a:t>
+            </a:r>
+            <a:r>
+              <a:rPr lang="tr-TR" dirty="0" err="1" smtClean="0"/>
+              <a:t>easier</a:t>
+            </a:r>
+            <a:r>
+              <a:rPr lang="tr-TR" dirty="0" smtClean="0"/>
+              <a:t>, </a:t>
+            </a:r>
+            <a:r>
+              <a:rPr lang="tr-TR" dirty="0" err="1" smtClean="0"/>
+              <a:t>shorter</a:t>
+            </a:r>
+            <a:r>
+              <a:rPr lang="tr-TR" dirty="0" smtClean="0"/>
+              <a:t> </a:t>
+            </a:r>
+            <a:r>
+              <a:rPr lang="tr-TR" dirty="0" err="1" smtClean="0"/>
+              <a:t>and</a:t>
+            </a:r>
+            <a:r>
+              <a:rPr lang="tr-TR" dirty="0" smtClean="0"/>
+              <a:t> </a:t>
+            </a:r>
+            <a:r>
+              <a:rPr lang="tr-TR" dirty="0" err="1" smtClean="0"/>
+              <a:t>more</a:t>
+            </a:r>
+            <a:r>
+              <a:rPr lang="tr-TR" dirty="0" smtClean="0"/>
+              <a:t> </a:t>
+            </a:r>
+            <a:r>
+              <a:rPr lang="tr-TR" dirty="0" err="1" smtClean="0"/>
+              <a:t>practical</a:t>
+            </a:r>
+            <a:r>
+              <a:rPr lang="tr-TR" dirty="0" smtClean="0"/>
+              <a:t> </a:t>
+            </a:r>
+            <a:r>
+              <a:rPr lang="tr-TR" dirty="0" err="1" smtClean="0"/>
+              <a:t>than</a:t>
+            </a:r>
+            <a:r>
+              <a:rPr lang="tr-TR" dirty="0" smtClean="0"/>
+              <a:t> </a:t>
+            </a:r>
+            <a:r>
+              <a:rPr lang="tr-TR" dirty="0" err="1" smtClean="0"/>
+              <a:t>constructor</a:t>
+            </a:r>
+            <a:r>
+              <a:rPr lang="tr-TR" dirty="0" smtClean="0"/>
+              <a:t> </a:t>
+            </a:r>
+            <a:r>
+              <a:rPr lang="tr-TR" dirty="0" err="1" smtClean="0"/>
+              <a:t>syntax</a:t>
+            </a:r>
+            <a:r>
+              <a:rPr lang="tr-TR" dirty="0" smtClean="0"/>
+              <a:t>. </a:t>
+            </a:r>
+            <a:r>
+              <a:rPr lang="tr-TR" dirty="0" smtClean="0"/>
+              <a:t>T</a:t>
+            </a:r>
+            <a:r>
+              <a:rPr lang="en-US" dirty="0" smtClean="0"/>
+              <a:t>his </a:t>
+            </a:r>
+            <a:r>
+              <a:rPr lang="en-US" dirty="0" smtClean="0"/>
+              <a:t>is the main reason why it is more </a:t>
+            </a:r>
+            <a:r>
+              <a:rPr lang="en-US" dirty="0" smtClean="0"/>
+              <a:t>preferred</a:t>
+            </a:r>
+            <a:r>
+              <a:rPr lang="tr-TR" dirty="0" smtClean="0"/>
+              <a:t>.</a:t>
+            </a:r>
+            <a:endParaRPr lang="tr-TR" dirty="0"/>
+          </a:p>
+        </p:txBody>
+      </p:sp>
+    </p:spTree>
+  </p:cSld>
+  <p:clrMapOvr>
+    <a:masterClrMapping/>
+  </p:clrMapOvr>
+</p:sld>
+</file>
+
+<file path=ppt/slides/slide19.xml><?xml version="1.0" encoding="utf-8"?>
+<p:sld xmlns:a="http://schemas.openxmlformats.org/drawingml/2006/main" xmlns:r="http://schemas.openxmlformats.org/officeDocument/2006/relationships" xmlns:p="http://schemas.openxmlformats.org/presentationml/2006/main">
+  <p:cSld>
+    <p:spTree>
+      <p:nvGrpSpPr>
+        <p:cNvPr id="1" name=""/>
+        <p:cNvGrpSpPr/>
+        <p:nvPr/>
+      </p:nvGrpSpPr>
+      <p:grpSpPr>
+        <a:xfrm>
+          <a:off x="0" y="0"/>
+          <a:ext cx="0" cy="0"/>
+          <a:chOff x="0" y="0"/>
+          <a:chExt cx="0" cy="0"/>
+        </a:xfrm>
+      </p:grpSpPr>
+      <p:sp>
+        <p:nvSpPr>
+          <p:cNvPr id="3" name="2 İçerik Yer Tutucusu"/>
+          <p:cNvSpPr>
+            <a:spLocks noGrp="1"/>
+          </p:cNvSpPr>
+          <p:nvPr>
+            <p:ph idx="1"/>
+          </p:nvPr>
+        </p:nvSpPr>
+        <p:spPr/>
+        <p:txBody>
+          <a:bodyPr/>
+          <a:lstStyle/>
+          <a:p>
+            <a:r>
+              <a:rPr lang="tr-TR" dirty="0" err="1" smtClean="0"/>
+              <a:t>Array</a:t>
+            </a:r>
+            <a:r>
+              <a:rPr lang="tr-TR" dirty="0" smtClean="0"/>
+              <a:t>() </a:t>
+            </a:r>
+            <a:r>
+              <a:rPr lang="tr-TR" dirty="0" err="1" smtClean="0"/>
+              <a:t>structure</a:t>
+            </a:r>
+            <a:r>
+              <a:rPr lang="tr-TR" dirty="0" smtClean="0"/>
+              <a:t> in </a:t>
+            </a:r>
+            <a:r>
+              <a:rPr lang="tr-TR" dirty="0" err="1" smtClean="0"/>
+              <a:t>constructor</a:t>
+            </a:r>
+            <a:r>
+              <a:rPr lang="tr-TR" dirty="0" smtClean="0"/>
+              <a:t> </a:t>
+            </a:r>
+            <a:r>
+              <a:rPr lang="tr-TR" dirty="0" err="1" smtClean="0"/>
+              <a:t>syntax</a:t>
+            </a:r>
+            <a:r>
+              <a:rPr lang="tr-TR" dirty="0" smtClean="0"/>
+              <a:t> can be </a:t>
+            </a:r>
+            <a:r>
+              <a:rPr lang="tr-TR" dirty="0" err="1" smtClean="0"/>
+              <a:t>overridden</a:t>
+            </a:r>
+            <a:r>
+              <a:rPr lang="tr-TR" dirty="0" smtClean="0"/>
+              <a:t> </a:t>
+            </a:r>
+            <a:r>
+              <a:rPr lang="tr-TR" dirty="0" err="1" smtClean="0"/>
+              <a:t>therefore</a:t>
+            </a:r>
+            <a:r>
+              <a:rPr lang="tr-TR" dirty="0" smtClean="0"/>
+              <a:t> it </a:t>
+            </a:r>
+            <a:r>
+              <a:rPr lang="tr-TR" dirty="0" err="1" smtClean="0"/>
+              <a:t>may</a:t>
+            </a:r>
+            <a:r>
+              <a:rPr lang="tr-TR" dirty="0" smtClean="0"/>
+              <a:t> </a:t>
+            </a:r>
+            <a:r>
+              <a:rPr lang="tr-TR" dirty="0" err="1" smtClean="0"/>
+              <a:t>cause</a:t>
+            </a:r>
+            <a:r>
+              <a:rPr lang="tr-TR" dirty="0" smtClean="0"/>
+              <a:t> </a:t>
+            </a:r>
+            <a:r>
+              <a:rPr lang="tr-TR" dirty="0" err="1" smtClean="0"/>
+              <a:t>problems</a:t>
+            </a:r>
+            <a:r>
+              <a:rPr lang="tr-TR" dirty="0" smtClean="0"/>
+              <a:t> in </a:t>
+            </a:r>
+            <a:r>
+              <a:rPr lang="tr-TR" dirty="0" err="1" smtClean="0"/>
+              <a:t>projects</a:t>
+            </a:r>
+            <a:r>
+              <a:rPr lang="tr-TR" dirty="0" smtClean="0"/>
+              <a:t> </a:t>
+            </a:r>
+            <a:r>
+              <a:rPr lang="tr-TR" dirty="0" err="1" smtClean="0"/>
+              <a:t>if</a:t>
+            </a:r>
+            <a:r>
+              <a:rPr lang="tr-TR" dirty="0" smtClean="0"/>
+              <a:t> a </a:t>
+            </a:r>
+            <a:r>
+              <a:rPr lang="tr-TR" dirty="0" err="1" smtClean="0"/>
+              <a:t>function</a:t>
+            </a:r>
+            <a:r>
+              <a:rPr lang="tr-TR" dirty="0" smtClean="0"/>
+              <a:t> </a:t>
+            </a:r>
+            <a:r>
+              <a:rPr lang="tr-TR" dirty="0" err="1" smtClean="0"/>
+              <a:t>named</a:t>
+            </a:r>
+            <a:r>
+              <a:rPr lang="tr-TR" dirty="0" smtClean="0"/>
+              <a:t> “</a:t>
+            </a:r>
+            <a:r>
+              <a:rPr lang="tr-TR" dirty="0" err="1" smtClean="0"/>
+              <a:t>Array</a:t>
+            </a:r>
+            <a:r>
+              <a:rPr lang="tr-TR" dirty="0" smtClean="0"/>
+              <a:t>” </a:t>
+            </a:r>
+            <a:r>
+              <a:rPr lang="tr-TR" dirty="0" err="1" smtClean="0"/>
+              <a:t>defined</a:t>
+            </a:r>
+            <a:r>
+              <a:rPr lang="tr-TR" dirty="0" smtClean="0"/>
+              <a:t>.</a:t>
+            </a:r>
+          </a:p>
+          <a:p>
+            <a:r>
+              <a:rPr lang="tr-TR" dirty="0" err="1" smtClean="0"/>
+              <a:t>Alerts</a:t>
+            </a:r>
+            <a:r>
+              <a:rPr lang="tr-TR" dirty="0" smtClean="0"/>
+              <a:t> in </a:t>
+            </a:r>
+            <a:r>
+              <a:rPr lang="tr-TR" dirty="0" err="1" smtClean="0"/>
+              <a:t>constructor</a:t>
+            </a:r>
+            <a:r>
+              <a:rPr lang="tr-TR" dirty="0" smtClean="0"/>
+              <a:t> </a:t>
+            </a:r>
+            <a:r>
+              <a:rPr lang="tr-TR" dirty="0" err="1" smtClean="0"/>
+              <a:t>syntax</a:t>
+            </a:r>
+            <a:r>
+              <a:rPr lang="tr-TR" dirty="0" smtClean="0"/>
+              <a:t> is </a:t>
+            </a:r>
+            <a:r>
+              <a:rPr lang="tr-TR" dirty="0" err="1" smtClean="0"/>
+              <a:t>confusing</a:t>
+            </a:r>
+            <a:r>
+              <a:rPr lang="tr-TR" dirty="0" smtClean="0"/>
+              <a:t>.</a:t>
+            </a:r>
+            <a:endParaRPr lang="tr-TR" dirty="0"/>
           </a:p>
         </p:txBody>
       </p:sp>

</xml_diff>